<commit_message>
update diagrams and pptx
</commit_message>
<xml_diff>
--- a/Ski Resort.pptx
+++ b/Ski Resort.pptx
@@ -203,33 +203,6 @@
 </inkml:ink>
 </file>
 
-<file path=ppt/ink/ink4.xml><?xml version="1.0" encoding="utf-8"?>
-<inkml:ink xmlns:inkml="http://www.w3.org/2003/InkML">
-  <inkml:definitions>
-    <inkml:context xml:id="ctx0">
-      <inkml:inkSource xml:id="inkSrc0">
-        <inkml:traceFormat>
-          <inkml:channel name="X" type="integer" min="-2.14748E9" max="2.14748E9" units="cm"/>
-          <inkml:channel name="Y" type="integer" min="-2.14748E9" max="2.14748E9" units="cm"/>
-          <inkml:channel name="F" type="integer" max="32767" units="dev"/>
-        </inkml:traceFormat>
-        <inkml:channelProperties>
-          <inkml:channelProperty channel="X" name="resolution" value="1000" units="1/cm"/>
-          <inkml:channelProperty channel="Y" name="resolution" value="1000" units="1/cm"/>
-          <inkml:channelProperty channel="F" name="resolution" value="0" units="1/dev"/>
-        </inkml:channelProperties>
-      </inkml:inkSource>
-      <inkml:timestamp xml:id="ts0" timeString="2025-11-14T14:00:24.574"/>
-    </inkml:context>
-    <inkml:brush xml:id="br0">
-      <inkml:brushProperty name="width" value="0.05" units="cm"/>
-      <inkml:brushProperty name="height" value="0.05" units="cm"/>
-    </inkml:brush>
-  </inkml:definitions>
-  <inkml:trace contextRef="#ctx0" brushRef="#br0">0 1 24575,'0'1'0,"1"0"0,3 1 0,1 0 0,1 1 0,0-1 0,0-1 0,0 2 0,1-1 0,0-1 0,-1 3 0,0 0 0,0 0 0,-1 0 0,1-1 0</inkml:trace>
-</inkml:ink>
-</file>
-
 <file path=ppt/slideLayouts/slideLayout1.xml><?xml version="1.0" encoding="utf-8"?>
 <p:sldLayout xmlns:a="http://schemas.openxmlformats.org/drawingml/2006/main" xmlns:r="http://schemas.openxmlformats.org/officeDocument/2006/relationships" xmlns:p="http://schemas.openxmlformats.org/presentationml/2006/main" type="title" preserve="1">
   <p:cSld name="Title Slide">
@@ -379,7 +352,7 @@
           <a:p>
             <a:fld id="{A401C85C-828C-4CE0-B0B6-00CF5569B46A}" type="datetimeFigureOut">
               <a:rPr lang="fr-FR" smtClean="0"/>
-              <a:t>16/11/2025</a:t>
+              <a:t>17/11/2025</a:t>
             </a:fld>
             <a:endParaRPr lang="fr-FR"/>
           </a:p>
@@ -579,7 +552,7 @@
           <a:p>
             <a:fld id="{A401C85C-828C-4CE0-B0B6-00CF5569B46A}" type="datetimeFigureOut">
               <a:rPr lang="fr-FR" smtClean="0"/>
-              <a:t>16/11/2025</a:t>
+              <a:t>17/11/2025</a:t>
             </a:fld>
             <a:endParaRPr lang="fr-FR"/>
           </a:p>
@@ -789,7 +762,7 @@
           <a:p>
             <a:fld id="{A401C85C-828C-4CE0-B0B6-00CF5569B46A}" type="datetimeFigureOut">
               <a:rPr lang="fr-FR" smtClean="0"/>
-              <a:t>16/11/2025</a:t>
+              <a:t>17/11/2025</a:t>
             </a:fld>
             <a:endParaRPr lang="fr-FR"/>
           </a:p>
@@ -989,7 +962,7 @@
           <a:p>
             <a:fld id="{A401C85C-828C-4CE0-B0B6-00CF5569B46A}" type="datetimeFigureOut">
               <a:rPr lang="fr-FR" smtClean="0"/>
-              <a:t>16/11/2025</a:t>
+              <a:t>17/11/2025</a:t>
             </a:fld>
             <a:endParaRPr lang="fr-FR"/>
           </a:p>
@@ -1265,7 +1238,7 @@
           <a:p>
             <a:fld id="{A401C85C-828C-4CE0-B0B6-00CF5569B46A}" type="datetimeFigureOut">
               <a:rPr lang="fr-FR" smtClean="0"/>
-              <a:t>16/11/2025</a:t>
+              <a:t>17/11/2025</a:t>
             </a:fld>
             <a:endParaRPr lang="fr-FR"/>
           </a:p>
@@ -1533,7 +1506,7 @@
           <a:p>
             <a:fld id="{A401C85C-828C-4CE0-B0B6-00CF5569B46A}" type="datetimeFigureOut">
               <a:rPr lang="fr-FR" smtClean="0"/>
-              <a:t>16/11/2025</a:t>
+              <a:t>17/11/2025</a:t>
             </a:fld>
             <a:endParaRPr lang="fr-FR"/>
           </a:p>
@@ -1948,7 +1921,7 @@
           <a:p>
             <a:fld id="{A401C85C-828C-4CE0-B0B6-00CF5569B46A}" type="datetimeFigureOut">
               <a:rPr lang="fr-FR" smtClean="0"/>
-              <a:t>16/11/2025</a:t>
+              <a:t>17/11/2025</a:t>
             </a:fld>
             <a:endParaRPr lang="fr-FR"/>
           </a:p>
@@ -2090,7 +2063,7 @@
           <a:p>
             <a:fld id="{A401C85C-828C-4CE0-B0B6-00CF5569B46A}" type="datetimeFigureOut">
               <a:rPr lang="fr-FR" smtClean="0"/>
-              <a:t>16/11/2025</a:t>
+              <a:t>17/11/2025</a:t>
             </a:fld>
             <a:endParaRPr lang="fr-FR"/>
           </a:p>
@@ -2203,7 +2176,7 @@
           <a:p>
             <a:fld id="{A401C85C-828C-4CE0-B0B6-00CF5569B46A}" type="datetimeFigureOut">
               <a:rPr lang="fr-FR" smtClean="0"/>
-              <a:t>16/11/2025</a:t>
+              <a:t>17/11/2025</a:t>
             </a:fld>
             <a:endParaRPr lang="fr-FR"/>
           </a:p>
@@ -2516,7 +2489,7 @@
           <a:p>
             <a:fld id="{A401C85C-828C-4CE0-B0B6-00CF5569B46A}" type="datetimeFigureOut">
               <a:rPr lang="fr-FR" smtClean="0"/>
-              <a:t>16/11/2025</a:t>
+              <a:t>17/11/2025</a:t>
             </a:fld>
             <a:endParaRPr lang="fr-FR"/>
           </a:p>
@@ -2805,7 +2778,7 @@
           <a:p>
             <a:fld id="{A401C85C-828C-4CE0-B0B6-00CF5569B46A}" type="datetimeFigureOut">
               <a:rPr lang="fr-FR" smtClean="0"/>
-              <a:t>16/11/2025</a:t>
+              <a:t>17/11/2025</a:t>
             </a:fld>
             <a:endParaRPr lang="fr-FR"/>
           </a:p>
@@ -3048,7 +3021,7 @@
           <a:p>
             <a:fld id="{A401C85C-828C-4CE0-B0B6-00CF5569B46A}" type="datetimeFigureOut">
               <a:rPr lang="fr-FR" smtClean="0"/>
-              <a:t>16/11/2025</a:t>
+              <a:t>17/11/2025</a:t>
             </a:fld>
             <a:endParaRPr lang="fr-FR"/>
           </a:p>
@@ -4324,12 +4297,8 @@
               <a:t>Dependencies: Hibernate, JPA Jakarta, </a:t>
             </a:r>
             <a:r>
-              <a:rPr lang="en-US" sz="2400" dirty="0" err="1"/>
-              <a:t>postgresql</a:t>
-            </a:r>
-            <a:r>
-              <a:rPr lang="en-US" sz="2400" dirty="0"/>
-              <a:t>, </a:t>
+              <a:rPr lang="en-US" sz="2400"/>
+              <a:t>postgreSQL, </a:t>
             </a:r>
             <a:r>
               <a:rPr lang="en-US" sz="2400" dirty="0" err="1"/>
@@ -5393,58 +5362,9 @@
         </p:spPr>
         <p:txBody>
           <a:bodyPr anchor="ctr">
-            <a:normAutofit/>
+            <a:normAutofit lnSpcReduction="10000"/>
           </a:bodyPr>
           <a:lstStyle/>
-          <a:p>
-            <a:pPr marL="0" indent="0">
-              <a:buNone/>
-            </a:pPr>
-            <a:r>
-              <a:rPr lang="fr-FR" sz="2200" dirty="0"/>
-              <a:t>A Java app </a:t>
-            </a:r>
-            <a:r>
-              <a:rPr lang="fr-FR" sz="2200" dirty="0" err="1"/>
-              <a:t>that</a:t>
-            </a:r>
-            <a:r>
-              <a:rPr lang="fr-FR" sz="2200" dirty="0"/>
-              <a:t> </a:t>
-            </a:r>
-            <a:r>
-              <a:rPr lang="fr-FR" sz="2200" dirty="0" err="1"/>
-              <a:t>handles</a:t>
-            </a:r>
-            <a:r>
-              <a:rPr lang="fr-FR" sz="2200" dirty="0"/>
-              <a:t> </a:t>
-            </a:r>
-            <a:r>
-              <a:rPr lang="fr-FR" sz="2200" dirty="0" err="1"/>
-              <a:t>everyday</a:t>
-            </a:r>
-            <a:r>
-              <a:rPr lang="fr-FR" sz="2200" dirty="0"/>
-              <a:t> </a:t>
-            </a:r>
-            <a:r>
-              <a:rPr lang="fr-FR" sz="2200" dirty="0" err="1"/>
-              <a:t>events</a:t>
-            </a:r>
-            <a:r>
-              <a:rPr lang="fr-FR" sz="2200" dirty="0"/>
-              <a:t> and routine checks of a ski </a:t>
-            </a:r>
-            <a:r>
-              <a:rPr lang="fr-FR" sz="2200" dirty="0" err="1"/>
-              <a:t>resort</a:t>
-            </a:r>
-            <a:r>
-              <a:rPr lang="fr-FR" sz="2200" dirty="0"/>
-              <a:t>.</a:t>
-            </a:r>
-          </a:p>
           <a:p>
             <a:pPr marL="0" indent="0">
               <a:buNone/>
@@ -5455,7 +5375,86 @@
             <a:pPr marL="0" indent="0">
               <a:buNone/>
             </a:pPr>
-            <a:endParaRPr lang="fr-FR" sz="2200" dirty="0"/>
+            <a:r>
+              <a:rPr lang="fr-FR" sz="2200" dirty="0"/>
+              <a:t>An app, </a:t>
+            </a:r>
+            <a:r>
+              <a:rPr lang="fr-FR" sz="2200" dirty="0" err="1"/>
+              <a:t>wrapping</a:t>
+            </a:r>
+            <a:r>
+              <a:rPr lang="fr-FR" sz="2200" dirty="0"/>
+              <a:t> </a:t>
+            </a:r>
+            <a:r>
+              <a:rPr lang="fr-FR" sz="2200" b="1" dirty="0"/>
+              <a:t>Java</a:t>
+            </a:r>
+            <a:r>
+              <a:rPr lang="fr-FR" sz="2200" dirty="0"/>
+              <a:t> software and </a:t>
+            </a:r>
+            <a:r>
+              <a:rPr lang="fr-FR" sz="2200" b="1" dirty="0"/>
+              <a:t>SQL</a:t>
+            </a:r>
+            <a:r>
+              <a:rPr lang="fr-FR" sz="2200" dirty="0"/>
+              <a:t> </a:t>
+            </a:r>
+            <a:r>
+              <a:rPr lang="fr-FR" sz="2200" dirty="0" err="1"/>
+              <a:t>database</a:t>
+            </a:r>
+            <a:r>
+              <a:rPr lang="fr-FR" sz="2200" dirty="0"/>
+              <a:t>, </a:t>
+            </a:r>
+            <a:r>
+              <a:rPr lang="fr-FR" sz="2200" dirty="0" err="1"/>
+              <a:t>that</a:t>
+            </a:r>
+            <a:r>
+              <a:rPr lang="fr-FR" sz="2200" dirty="0"/>
+              <a:t> </a:t>
+            </a:r>
+            <a:r>
+              <a:rPr lang="fr-FR" sz="2200" dirty="0" err="1"/>
+              <a:t>allows</a:t>
+            </a:r>
+            <a:r>
+              <a:rPr lang="fr-FR" sz="2200" dirty="0"/>
+              <a:t> management of a ski </a:t>
+            </a:r>
+            <a:r>
+              <a:rPr lang="fr-FR" sz="2200" dirty="0" err="1"/>
+              <a:t>resort</a:t>
+            </a:r>
+            <a:r>
+              <a:rPr lang="fr-FR" sz="2200" dirty="0"/>
+              <a:t>: </a:t>
+            </a:r>
+            <a:r>
+              <a:rPr lang="fr-FR" sz="2200" b="1" dirty="0" err="1"/>
+              <a:t>Guests</a:t>
+            </a:r>
+            <a:r>
+              <a:rPr lang="fr-FR" sz="2200" b="1" dirty="0"/>
+              <a:t> + Tickets </a:t>
+            </a:r>
+            <a:r>
+              <a:rPr lang="fr-FR" sz="2200" b="1" dirty="0" err="1"/>
+              <a:t>creation</a:t>
+            </a:r>
+            <a:r>
+              <a:rPr lang="fr-FR" sz="2200" b="1" dirty="0"/>
+              <a:t> and routine checks</a:t>
+            </a:r>
+            <a:r>
+              <a:rPr lang="fr-FR" sz="2200" dirty="0"/>
+              <a:t>.</a:t>
+            </a:r>
           </a:p>
           <a:p>
             <a:pPr marL="0" indent="0">
@@ -5467,16 +5466,83 @@
             <a:pPr marL="0" indent="0">
               <a:buNone/>
             </a:pPr>
+            <a:r>
+              <a:rPr lang="fr-FR" sz="2200" dirty="0"/>
+              <a:t>The app </a:t>
+            </a:r>
+            <a:r>
+              <a:rPr lang="fr-FR" sz="2200" dirty="0" err="1"/>
+              <a:t>mirrors</a:t>
+            </a:r>
+            <a:r>
+              <a:rPr lang="fr-FR" sz="2200" dirty="0"/>
+              <a:t> </a:t>
+            </a:r>
+            <a:r>
+              <a:rPr lang="fr-FR" sz="2200" dirty="0" err="1"/>
+              <a:t>current</a:t>
+            </a:r>
+            <a:r>
+              <a:rPr lang="fr-FR" sz="2200" dirty="0"/>
+              <a:t> </a:t>
+            </a:r>
+            <a:r>
+              <a:rPr lang="fr-FR" sz="2200" b="1" dirty="0"/>
+              <a:t>UML </a:t>
+            </a:r>
+            <a:r>
+              <a:rPr lang="fr-FR" sz="2200" b="1" dirty="0" err="1"/>
+              <a:t>industry</a:t>
+            </a:r>
+            <a:r>
+              <a:rPr lang="fr-FR" sz="2200" b="1" dirty="0"/>
+              <a:t> standards</a:t>
+            </a:r>
+            <a:r>
+              <a:rPr lang="fr-FR" sz="2200" dirty="0"/>
+              <a:t>, </a:t>
+            </a:r>
+            <a:r>
+              <a:rPr lang="fr-FR" sz="2200" dirty="0" err="1"/>
+              <a:t>such</a:t>
+            </a:r>
+            <a:r>
+              <a:rPr lang="fr-FR" sz="2200" dirty="0"/>
+              <a:t> as </a:t>
+            </a:r>
+            <a:r>
+              <a:rPr lang="fr-FR" sz="2200" b="1" dirty="0"/>
+              <a:t>MIP</a:t>
+            </a:r>
+            <a:r>
+              <a:rPr lang="fr-FR" sz="2200" dirty="0"/>
+              <a:t> and </a:t>
+            </a:r>
+            <a:r>
+              <a:rPr lang="fr-FR" sz="2200" b="1" dirty="0"/>
+              <a:t>no-HPE</a:t>
+            </a:r>
+            <a:r>
+              <a:rPr lang="fr-FR" sz="2200" dirty="0"/>
+              <a:t>.</a:t>
+            </a:r>
+          </a:p>
+          <a:p>
+            <a:pPr marL="0" indent="0">
+              <a:buNone/>
+            </a:pPr>
             <a:endParaRPr lang="fr-FR" sz="2200" dirty="0"/>
           </a:p>
           <a:p>
-            <a:r>
-              <a:rPr lang="fr-FR" sz="2200" dirty="0" err="1"/>
-              <a:t>Uml</a:t>
-            </a:r>
+            <a:pPr marL="0" indent="0">
+              <a:buNone/>
+            </a:pPr>
+            <a:endParaRPr lang="fr-FR" sz="2200" dirty="0"/>
+          </a:p>
+          <a:p>
             <a:r>
               <a:rPr lang="fr-FR" sz="2200" dirty="0"/>
-              <a:t> Tool </a:t>
+              <a:t>UML Model Tool </a:t>
             </a:r>
             <a:r>
               <a:rPr lang="fr-FR" sz="2200" dirty="0" err="1"/>
@@ -5484,32 +5550,17 @@
             </a:r>
             <a:r>
               <a:rPr lang="fr-FR" sz="2200" dirty="0"/>
-              <a:t>: Visual </a:t>
-            </a:r>
-            <a:r>
-              <a:rPr lang="fr-FR" sz="2200" dirty="0" err="1"/>
+              <a:t>: </a:t>
+            </a:r>
+            <a:r>
+              <a:rPr lang="fr-FR" sz="2200" b="1" dirty="0"/>
+              <a:t>Visual </a:t>
+            </a:r>
+            <a:r>
+              <a:rPr lang="fr-FR" sz="2200" b="1" dirty="0" err="1"/>
               <a:t>Paradigm</a:t>
             </a:r>
-            <a:endParaRPr lang="fr-FR" sz="2200" dirty="0"/>
-          </a:p>
-          <a:p>
-            <a:r>
-              <a:rPr lang="fr-FR" sz="2200" dirty="0"/>
-              <a:t>Actors: Person, Terrain, </a:t>
-            </a:r>
-            <a:r>
-              <a:rPr lang="fr-FR" sz="2200" dirty="0" err="1"/>
-              <a:t>Pass</a:t>
-            </a:r>
-            <a:r>
-              <a:rPr lang="fr-FR" sz="2200" dirty="0"/>
-              <a:t>, </a:t>
-            </a:r>
-            <a:r>
-              <a:rPr lang="fr-FR" sz="2200" dirty="0" err="1"/>
-              <a:t>Resort</a:t>
-            </a:r>
-            <a:endParaRPr lang="fr-FR" sz="2200" dirty="0"/>
+            <a:endParaRPr lang="fr-FR" sz="2200" b="1" dirty="0"/>
           </a:p>
           <a:p>
             <a:pPr marL="0" indent="0">
@@ -5659,35 +5710,35 @@
             <a:pPr lvl="1"/>
             <a:r>
               <a:rPr lang="en-US" dirty="0"/>
-              <a:t>Buy Pass</a:t>
+              <a:t>Buy</a:t>
             </a:r>
           </a:p>
           <a:p>
             <a:pPr lvl="1"/>
             <a:r>
               <a:rPr lang="en-US" dirty="0"/>
-              <a:t>Issue Pass</a:t>
+              <a:t>Issue</a:t>
             </a:r>
           </a:p>
           <a:p>
             <a:pPr lvl="1"/>
             <a:r>
               <a:rPr lang="en-US" dirty="0"/>
-              <a:t>Use Pass</a:t>
+              <a:t>Use</a:t>
             </a:r>
           </a:p>
           <a:p>
             <a:pPr lvl="1"/>
             <a:r>
               <a:rPr lang="en-US" dirty="0"/>
-              <a:t>Collect Pass Data</a:t>
+              <a:t>Scan </a:t>
             </a:r>
           </a:p>
           <a:p>
             <a:pPr lvl="1"/>
             <a:r>
               <a:rPr lang="en-US" dirty="0"/>
-              <a:t>Scan Pass </a:t>
+              <a:t>Collect Usage Metrics</a:t>
             </a:r>
           </a:p>
         </p:txBody>
@@ -5706,8 +5757,8 @@
         </p:nvSpPr>
         <p:spPr>
           <a:xfrm>
-            <a:off x="6853083" y="1905506"/>
-            <a:ext cx="5338917" cy="3046988"/>
+            <a:off x="6853083" y="1690105"/>
+            <a:ext cx="5338917" cy="3416320"/>
           </a:xfrm>
           <a:prstGeom prst="rect">
             <a:avLst/>
@@ -5736,7 +5787,7 @@
             </a:pPr>
             <a:r>
               <a:rPr lang="en-US" sz="2400" dirty="0"/>
-              <a:t>Advertise Discounted Day</a:t>
+              <a:t>Advertise</a:t>
             </a:r>
           </a:p>
           <a:p>
@@ -5746,7 +5797,7 @@
             </a:pPr>
             <a:r>
               <a:rPr lang="en-US" sz="2400" dirty="0"/>
-              <a:t>Suspend Pass</a:t>
+              <a:t>Suspend</a:t>
             </a:r>
           </a:p>
           <a:p>
@@ -5777,6 +5828,16 @@
             <a:r>
               <a:rPr lang="en-US" sz="2400" dirty="0"/>
               <a:t>Send Alert</a:t>
+            </a:r>
+          </a:p>
+          <a:p>
+            <a:pPr marL="742950" lvl="1" indent="-285750">
+              <a:buFont typeface="Arial" panose="020B0604020202020204" pitchFamily="34" charset="0"/>
+              <a:buChar char="•"/>
+            </a:pPr>
+            <a:r>
+              <a:rPr lang="en-US" sz="2400" dirty="0"/>
+              <a:t>Update Map</a:t>
             </a:r>
           </a:p>
           <a:p>
@@ -5839,7 +5900,7 @@
             </a:pPr>
             <a:r>
               <a:rPr lang="en-US" sz="2400" dirty="0"/>
-              <a:t>Create Person</a:t>
+              <a:t>Search</a:t>
             </a:r>
           </a:p>
           <a:p>
@@ -5849,7 +5910,7 @@
             </a:pPr>
             <a:r>
               <a:rPr lang="en-US" sz="2400" dirty="0"/>
-              <a:t>Search in Persons</a:t>
+              <a:t>Create</a:t>
             </a:r>
           </a:p>
           <a:p>
@@ -5872,7 +5933,7 @@
         <p:spPr>
           <a:xfrm>
             <a:off x="6853083" y="4671932"/>
-            <a:ext cx="4650658" cy="1569660"/>
+            <a:ext cx="4650658" cy="1938992"/>
           </a:xfrm>
           <a:prstGeom prst="rect">
             <a:avLst/>
@@ -5901,7 +5962,7 @@
             </a:pPr>
             <a:r>
               <a:rPr lang="en-US" sz="2400" dirty="0"/>
-              <a:t>Search in Terrain</a:t>
+              <a:t>Search</a:t>
             </a:r>
           </a:p>
           <a:p>
@@ -5911,8 +5972,12 @@
             </a:pPr>
             <a:r>
               <a:rPr lang="en-US" sz="2400" dirty="0"/>
-              <a:t>Log uses</a:t>
-            </a:r>
+              <a:t>Log Lift use</a:t>
+            </a:r>
+          </a:p>
+          <a:p>
+            <a:pPr lvl="1"/>
+            <a:endParaRPr lang="en-US" sz="2400" dirty="0"/>
           </a:p>
           <a:p>
             <a:pPr marL="742950" lvl="1" indent="-285750">
@@ -6001,7 +6066,7 @@
             </a:r>
             <a:r>
               <a:rPr lang="en-US" sz="5200" dirty="0"/>
-              <a:t> - Passes</a:t>
+              <a:t> – Passes (Simple)</a:t>
             </a:r>
             <a:endParaRPr lang="en-US" sz="5200" kern="1200" dirty="0">
               <a:solidFill>
@@ -6249,7 +6314,7 @@
             </a:r>
             <a:r>
               <a:rPr lang="en-US" sz="5200" dirty="0"/>
-              <a:t> - Events</a:t>
+              <a:t> – Events (Simple)</a:t>
             </a:r>
             <a:endParaRPr lang="en-US" sz="5200" kern="1200" dirty="0">
               <a:solidFill>
@@ -6559,39 +6624,9 @@
           </a:p>
         </p:txBody>
       </p:sp>
-      <p:pic>
-        <p:nvPicPr>
-          <p:cNvPr id="10" name="Picture 9">
-            <a:extLst>
-              <a:ext uri="{FF2B5EF4-FFF2-40B4-BE49-F238E27FC236}">
-                <a16:creationId xmlns:a16="http://schemas.microsoft.com/office/drawing/2014/main" id="{93256E05-5443-A38F-25E6-FC915A85358F}"/>
-              </a:ext>
-            </a:extLst>
-          </p:cNvPr>
-          <p:cNvPicPr>
-            <a:picLocks noChangeAspect="1"/>
-          </p:cNvPicPr>
-          <p:nvPr/>
-        </p:nvPicPr>
-        <p:blipFill>
-          <a:blip r:embed="rId2"/>
-          <a:stretch>
-            <a:fillRect/>
-          </a:stretch>
-        </p:blipFill>
-        <p:spPr>
-          <a:xfrm>
-            <a:off x="6165660" y="2584257"/>
-            <a:ext cx="1769247" cy="660387"/>
-          </a:xfrm>
-          <a:prstGeom prst="rect">
-            <a:avLst/>
-          </a:prstGeom>
-        </p:spPr>
-      </p:pic>
-      <mc:AlternateContent xmlns:mc="http://schemas.openxmlformats.org/markup-compatibility/2006">
-        <mc:Choice xmlns:p14="http://schemas.microsoft.com/office/powerpoint/2010/main" Requires="p14">
-          <p:contentPart p14:bwMode="auto" r:id="rId3">
+      <mc:AlternateContent xmlns:mc="http://schemas.openxmlformats.org/markup-compatibility/2006" xmlns:p14="http://schemas.microsoft.com/office/powerpoint/2010/main">
+        <mc:Choice Requires="p14">
+          <p:contentPart p14:bwMode="auto" r:id="rId2">
             <p14:nvContentPartPr>
               <p14:cNvPr id="11" name="Ink 10">
                 <a:extLst>
@@ -6609,7 +6644,7 @@
             </p14:xfrm>
           </p:contentPart>
         </mc:Choice>
-        <mc:Fallback>
+        <mc:Fallback xmlns="">
           <p:pic>
             <p:nvPicPr>
               <p:cNvPr id="11" name="Ink 10">
@@ -6640,101 +6675,12 @@
           </p:pic>
         </mc:Fallback>
       </mc:AlternateContent>
-      <p:cxnSp>
-        <p:nvCxnSpPr>
-          <p:cNvPr id="13" name="Straight Connector 12">
-            <a:extLst>
-              <a:ext uri="{FF2B5EF4-FFF2-40B4-BE49-F238E27FC236}">
-                <a16:creationId xmlns:a16="http://schemas.microsoft.com/office/drawing/2014/main" id="{13285F47-6DD4-1F9B-7854-8F66143EDFFE}"/>
-              </a:ext>
-            </a:extLst>
-          </p:cNvPr>
-          <p:cNvCxnSpPr>
-            <a:cxnSpLocks/>
-          </p:cNvCxnSpPr>
-          <p:nvPr/>
-        </p:nvCxnSpPr>
-        <p:spPr>
-          <a:xfrm flipH="1" flipV="1">
-            <a:off x="7595817" y="3185160"/>
-            <a:ext cx="701040" cy="278130"/>
-          </a:xfrm>
-          <a:prstGeom prst="line">
-            <a:avLst/>
-          </a:prstGeom>
-        </p:spPr>
-        <p:style>
-          <a:lnRef idx="2">
-            <a:schemeClr val="dk1"/>
-          </a:lnRef>
-          <a:fillRef idx="0">
-            <a:schemeClr val="dk1"/>
-          </a:fillRef>
-          <a:effectRef idx="1">
-            <a:schemeClr val="dk1"/>
-          </a:effectRef>
-          <a:fontRef idx="minor">
-            <a:schemeClr val="tx1"/>
-          </a:fontRef>
-        </p:style>
-      </p:cxnSp>
-      <mc:AlternateContent xmlns:mc="http://schemas.openxmlformats.org/markup-compatibility/2006">
-        <mc:Choice xmlns:p14="http://schemas.microsoft.com/office/powerpoint/2010/main" Requires="p14">
-          <p:contentPart p14:bwMode="auto" r:id="rId5">
-            <p14:nvContentPartPr>
-              <p14:cNvPr id="17" name="Ink 16">
-                <a:extLst>
-                  <a:ext uri="{FF2B5EF4-FFF2-40B4-BE49-F238E27FC236}">
-                    <a16:creationId xmlns:a16="http://schemas.microsoft.com/office/drawing/2014/main" id="{C5A13ACD-52E3-DDB9-3B26-C81FFBA8B3FE}"/>
-                  </a:ext>
-                </a:extLst>
-              </p14:cNvPr>
-              <p14:cNvContentPartPr/>
-              <p14:nvPr/>
-            </p14:nvContentPartPr>
-            <p14:xfrm>
-              <a:off x="7576800" y="3177320"/>
-              <a:ext cx="28080" cy="13680"/>
-            </p14:xfrm>
-          </p:contentPart>
-        </mc:Choice>
-        <mc:Fallback>
-          <p:pic>
-            <p:nvPicPr>
-              <p:cNvPr id="17" name="Ink 16">
-                <a:extLst>
-                  <a:ext uri="{FF2B5EF4-FFF2-40B4-BE49-F238E27FC236}">
-                    <a16:creationId xmlns:a16="http://schemas.microsoft.com/office/drawing/2014/main" id="{C5A13ACD-52E3-DDB9-3B26-C81FFBA8B3FE}"/>
-                  </a:ext>
-                </a:extLst>
-              </p:cNvPr>
-              <p:cNvPicPr/>
-              <p:nvPr/>
-            </p:nvPicPr>
-            <p:blipFill>
-              <a:blip r:embed="rId6"/>
-              <a:stretch>
-                <a:fillRect/>
-              </a:stretch>
-            </p:blipFill>
-            <p:spPr>
-              <a:xfrm>
-                <a:off x="7567800" y="3168320"/>
-                <a:ext cx="45720" cy="31320"/>
-              </a:xfrm>
-              <a:prstGeom prst="rect">
-                <a:avLst/>
-              </a:prstGeom>
-            </p:spPr>
-          </p:pic>
-        </mc:Fallback>
-      </mc:AlternateContent>
       <p:pic>
         <p:nvPicPr>
-          <p:cNvPr id="4" name="Picture 3" descr="A diagram of a diagram&#10;&#10;AI-generated content may be incorrect.">
-            <a:extLst>
-              <a:ext uri="{FF2B5EF4-FFF2-40B4-BE49-F238E27FC236}">
-                <a16:creationId xmlns:a16="http://schemas.microsoft.com/office/drawing/2014/main" id="{B0660A20-5410-BB98-F1E0-2109F0EAFC9F}"/>
+          <p:cNvPr id="5" name="Picture 4" descr="A diagram of a diagram&#10;&#10;AI-generated content may be incorrect.">
+            <a:extLst>
+              <a:ext uri="{FF2B5EF4-FFF2-40B4-BE49-F238E27FC236}">
+                <a16:creationId xmlns:a16="http://schemas.microsoft.com/office/drawing/2014/main" id="{B98D32F2-B2B9-4DA7-37D7-6BBC5F466389}"/>
               </a:ext>
             </a:extLst>
           </p:cNvPr>
@@ -6744,7 +6690,7 @@
           <p:nvPr/>
         </p:nvPicPr>
         <p:blipFill>
-          <a:blip r:embed="rId7">
+          <a:blip r:embed="rId5">
             <a:extLst>
               <a:ext uri="{28A0092B-C50C-407E-A947-70E740481C1C}">
                 <a14:useLocalDpi xmlns:a14="http://schemas.microsoft.com/office/drawing/2010/main" val="0"/>
@@ -6757,8 +6703,8 @@
         </p:blipFill>
         <p:spPr>
           <a:xfrm>
-            <a:off x="611753" y="1004923"/>
-            <a:ext cx="10965443" cy="5665948"/>
+            <a:off x="2560755" y="975048"/>
+            <a:ext cx="7067439" cy="5882952"/>
           </a:xfrm>
           <a:prstGeom prst="rect">
             <a:avLst/>

</xml_diff>